<commit_message>
Just removed the lung and added an arrow from VB to AB.
</commit_message>
<xml_diff>
--- a/other_files/tien plot model_TH150425.pptx
+++ b/other_files/tien plot model_TH150425.pptx
@@ -273,7 +273,7 @@
           <a:p>
             <a:fld id="{EFE2AB68-A8B7-432E-9CB9-84110CF7196D}" type="datetimeFigureOut">
               <a:rPr lang="nb-NO" smtClean="0"/>
-              <a:t>28.04.2025</a:t>
+              <a:t>15.09.2025</a:t>
             </a:fld>
             <a:endParaRPr lang="nb-NO"/>
           </a:p>
@@ -473,7 +473,7 @@
           <a:p>
             <a:fld id="{EFE2AB68-A8B7-432E-9CB9-84110CF7196D}" type="datetimeFigureOut">
               <a:rPr lang="nb-NO" smtClean="0"/>
-              <a:t>28.04.2025</a:t>
+              <a:t>15.09.2025</a:t>
             </a:fld>
             <a:endParaRPr lang="nb-NO"/>
           </a:p>
@@ -683,7 +683,7 @@
           <a:p>
             <a:fld id="{EFE2AB68-A8B7-432E-9CB9-84110CF7196D}" type="datetimeFigureOut">
               <a:rPr lang="nb-NO" smtClean="0"/>
-              <a:t>28.04.2025</a:t>
+              <a:t>15.09.2025</a:t>
             </a:fld>
             <a:endParaRPr lang="nb-NO"/>
           </a:p>
@@ -883,7 +883,7 @@
           <a:p>
             <a:fld id="{EFE2AB68-A8B7-432E-9CB9-84110CF7196D}" type="datetimeFigureOut">
               <a:rPr lang="nb-NO" smtClean="0"/>
-              <a:t>28.04.2025</a:t>
+              <a:t>15.09.2025</a:t>
             </a:fld>
             <a:endParaRPr lang="nb-NO"/>
           </a:p>
@@ -1159,7 +1159,7 @@
           <a:p>
             <a:fld id="{EFE2AB68-A8B7-432E-9CB9-84110CF7196D}" type="datetimeFigureOut">
               <a:rPr lang="nb-NO" smtClean="0"/>
-              <a:t>28.04.2025</a:t>
+              <a:t>15.09.2025</a:t>
             </a:fld>
             <a:endParaRPr lang="nb-NO"/>
           </a:p>
@@ -1427,7 +1427,7 @@
           <a:p>
             <a:fld id="{EFE2AB68-A8B7-432E-9CB9-84110CF7196D}" type="datetimeFigureOut">
               <a:rPr lang="nb-NO" smtClean="0"/>
-              <a:t>28.04.2025</a:t>
+              <a:t>15.09.2025</a:t>
             </a:fld>
             <a:endParaRPr lang="nb-NO"/>
           </a:p>
@@ -1842,7 +1842,7 @@
           <a:p>
             <a:fld id="{EFE2AB68-A8B7-432E-9CB9-84110CF7196D}" type="datetimeFigureOut">
               <a:rPr lang="nb-NO" smtClean="0"/>
-              <a:t>28.04.2025</a:t>
+              <a:t>15.09.2025</a:t>
             </a:fld>
             <a:endParaRPr lang="nb-NO"/>
           </a:p>
@@ -1984,7 +1984,7 @@
           <a:p>
             <a:fld id="{EFE2AB68-A8B7-432E-9CB9-84110CF7196D}" type="datetimeFigureOut">
               <a:rPr lang="nb-NO" smtClean="0"/>
-              <a:t>28.04.2025</a:t>
+              <a:t>15.09.2025</a:t>
             </a:fld>
             <a:endParaRPr lang="nb-NO"/>
           </a:p>
@@ -2097,7 +2097,7 @@
           <a:p>
             <a:fld id="{EFE2AB68-A8B7-432E-9CB9-84110CF7196D}" type="datetimeFigureOut">
               <a:rPr lang="nb-NO" smtClean="0"/>
-              <a:t>28.04.2025</a:t>
+              <a:t>15.09.2025</a:t>
             </a:fld>
             <a:endParaRPr lang="nb-NO"/>
           </a:p>
@@ -2410,7 +2410,7 @@
           <a:p>
             <a:fld id="{EFE2AB68-A8B7-432E-9CB9-84110CF7196D}" type="datetimeFigureOut">
               <a:rPr lang="nb-NO" smtClean="0"/>
-              <a:t>28.04.2025</a:t>
+              <a:t>15.09.2025</a:t>
             </a:fld>
             <a:endParaRPr lang="nb-NO"/>
           </a:p>
@@ -2699,7 +2699,7 @@
           <a:p>
             <a:fld id="{EFE2AB68-A8B7-432E-9CB9-84110CF7196D}" type="datetimeFigureOut">
               <a:rPr lang="nb-NO" smtClean="0"/>
-              <a:t>28.04.2025</a:t>
+              <a:t>15.09.2025</a:t>
             </a:fld>
             <a:endParaRPr lang="nb-NO"/>
           </a:p>
@@ -2942,7 +2942,7 @@
           <a:p>
             <a:fld id="{EFE2AB68-A8B7-432E-9CB9-84110CF7196D}" type="datetimeFigureOut">
               <a:rPr lang="nb-NO" smtClean="0"/>
-              <a:t>28.04.2025</a:t>
+              <a:t>15.09.2025</a:t>
             </a:fld>
             <a:endParaRPr lang="nb-NO"/>
           </a:p>
@@ -3361,10 +3361,10 @@
       </p:grpSpPr>
       <p:sp>
         <p:nvSpPr>
-          <p:cNvPr id="4" name="Rectangle 3">
-            <a:extLst>
-              <a:ext uri="{FF2B5EF4-FFF2-40B4-BE49-F238E27FC236}">
-                <a16:creationId xmlns:a16="http://schemas.microsoft.com/office/drawing/2014/main" id="{AAF07D09-7303-3FB2-2CFD-E5D571B1CD47}"/>
+          <p:cNvPr id="5" name="Rectangle 4">
+            <a:extLst>
+              <a:ext uri="{FF2B5EF4-FFF2-40B4-BE49-F238E27FC236}">
+                <a16:creationId xmlns:a16="http://schemas.microsoft.com/office/drawing/2014/main" id="{CEA0F57B-D95C-EB04-F1CE-3C2A2A727104}"/>
               </a:ext>
             </a:extLst>
           </p:cNvPr>
@@ -3373,7 +3373,7 @@
         </p:nvSpPr>
         <p:spPr>
           <a:xfrm>
-            <a:off x="2421166" y="1714500"/>
+            <a:off x="2402116" y="2571750"/>
             <a:ext cx="1885950" cy="628650"/>
           </a:xfrm>
           <a:prstGeom prst="rect">
@@ -3401,7 +3401,7 @@
             <a:pPr algn="ctr"/>
             <a:r>
               <a:rPr lang="en-US" dirty="0"/>
-              <a:t>Lung</a:t>
+              <a:t>Tissue</a:t>
             </a:r>
             <a:endParaRPr lang="nb-NO" dirty="0"/>
           </a:p>
@@ -3409,10 +3409,10 @@
       </p:sp>
       <p:sp>
         <p:nvSpPr>
-          <p:cNvPr id="5" name="Rectangle 4">
-            <a:extLst>
-              <a:ext uri="{FF2B5EF4-FFF2-40B4-BE49-F238E27FC236}">
-                <a16:creationId xmlns:a16="http://schemas.microsoft.com/office/drawing/2014/main" id="{CEA0F57B-D95C-EB04-F1CE-3C2A2A727104}"/>
+          <p:cNvPr id="6" name="Rectangle 5">
+            <a:extLst>
+              <a:ext uri="{FF2B5EF4-FFF2-40B4-BE49-F238E27FC236}">
+                <a16:creationId xmlns:a16="http://schemas.microsoft.com/office/drawing/2014/main" id="{316447AA-E857-E2CC-5369-345C8B04443E}"/>
               </a:ext>
             </a:extLst>
           </p:cNvPr>
@@ -3421,7 +3421,7 @@
         </p:nvSpPr>
         <p:spPr>
           <a:xfrm>
-            <a:off x="2402116" y="2571750"/>
+            <a:off x="2398487" y="3456214"/>
             <a:ext cx="1885950" cy="628650"/>
           </a:xfrm>
           <a:prstGeom prst="rect">
@@ -3449,7 +3449,7 @@
             <a:pPr algn="ctr"/>
             <a:r>
               <a:rPr lang="en-US" dirty="0"/>
-              <a:t>Tissue</a:t>
+              <a:t>Kidney</a:t>
             </a:r>
             <a:endParaRPr lang="nb-NO" dirty="0"/>
           </a:p>
@@ -3457,10 +3457,10 @@
       </p:sp>
       <p:sp>
         <p:nvSpPr>
-          <p:cNvPr id="6" name="Rectangle 5">
-            <a:extLst>
-              <a:ext uri="{FF2B5EF4-FFF2-40B4-BE49-F238E27FC236}">
-                <a16:creationId xmlns:a16="http://schemas.microsoft.com/office/drawing/2014/main" id="{316447AA-E857-E2CC-5369-345C8B04443E}"/>
+          <p:cNvPr id="7" name="Rectangle 6">
+            <a:extLst>
+              <a:ext uri="{FF2B5EF4-FFF2-40B4-BE49-F238E27FC236}">
+                <a16:creationId xmlns:a16="http://schemas.microsoft.com/office/drawing/2014/main" id="{83BED022-D9BA-69DA-7245-ED0609079A59}"/>
               </a:ext>
             </a:extLst>
           </p:cNvPr>
@@ -3469,7 +3469,7 @@
         </p:nvSpPr>
         <p:spPr>
           <a:xfrm>
-            <a:off x="2398487" y="3456214"/>
+            <a:off x="2395766" y="4316187"/>
             <a:ext cx="1885950" cy="628650"/>
           </a:xfrm>
           <a:prstGeom prst="rect">
@@ -3497,7 +3497,7 @@
             <a:pPr algn="ctr"/>
             <a:r>
               <a:rPr lang="en-US" dirty="0"/>
-              <a:t>Kidney</a:t>
+              <a:t>Liver</a:t>
             </a:r>
             <a:endParaRPr lang="nb-NO" dirty="0"/>
           </a:p>
@@ -3505,10 +3505,10 @@
       </p:sp>
       <p:sp>
         <p:nvSpPr>
-          <p:cNvPr id="7" name="Rectangle 6">
-            <a:extLst>
-              <a:ext uri="{FF2B5EF4-FFF2-40B4-BE49-F238E27FC236}">
-                <a16:creationId xmlns:a16="http://schemas.microsoft.com/office/drawing/2014/main" id="{83BED022-D9BA-69DA-7245-ED0609079A59}"/>
+          <p:cNvPr id="9" name="Rectangle 8">
+            <a:extLst>
+              <a:ext uri="{FF2B5EF4-FFF2-40B4-BE49-F238E27FC236}">
+                <a16:creationId xmlns:a16="http://schemas.microsoft.com/office/drawing/2014/main" id="{316BD13C-DC3F-278A-B097-5FB86E44F1F6}"/>
               </a:ext>
             </a:extLst>
           </p:cNvPr>
@@ -3517,7 +3517,7 @@
         </p:nvSpPr>
         <p:spPr>
           <a:xfrm>
-            <a:off x="2395766" y="4316187"/>
+            <a:off x="7446739" y="2571750"/>
             <a:ext cx="1885950" cy="628650"/>
           </a:xfrm>
           <a:prstGeom prst="rect">
@@ -3545,7 +3545,7 @@
             <a:pPr algn="ctr"/>
             <a:r>
               <a:rPr lang="en-US" dirty="0"/>
-              <a:t>Liver</a:t>
+              <a:t>Tissue</a:t>
             </a:r>
             <a:endParaRPr lang="nb-NO" dirty="0"/>
           </a:p>
@@ -3553,10 +3553,10 @@
       </p:sp>
       <p:sp>
         <p:nvSpPr>
-          <p:cNvPr id="8" name="Rectangle 7">
-            <a:extLst>
-              <a:ext uri="{FF2B5EF4-FFF2-40B4-BE49-F238E27FC236}">
-                <a16:creationId xmlns:a16="http://schemas.microsoft.com/office/drawing/2014/main" id="{B5A979A1-CC8A-AA13-E3D6-72F26BBFC4C0}"/>
+          <p:cNvPr id="10" name="Rectangle 9">
+            <a:extLst>
+              <a:ext uri="{FF2B5EF4-FFF2-40B4-BE49-F238E27FC236}">
+                <a16:creationId xmlns:a16="http://schemas.microsoft.com/office/drawing/2014/main" id="{3711075B-257E-F8AF-F9FB-445C59F33C5F}"/>
               </a:ext>
             </a:extLst>
           </p:cNvPr>
@@ -3565,7 +3565,7 @@
         </p:nvSpPr>
         <p:spPr>
           <a:xfrm>
-            <a:off x="7443110" y="1714500"/>
+            <a:off x="7443110" y="3456214"/>
             <a:ext cx="1885950" cy="628650"/>
           </a:xfrm>
           <a:prstGeom prst="rect">
@@ -3593,7 +3593,7 @@
             <a:pPr algn="ctr"/>
             <a:r>
               <a:rPr lang="en-US" dirty="0"/>
-              <a:t>Lung???</a:t>
+              <a:t>Kidney</a:t>
             </a:r>
             <a:endParaRPr lang="nb-NO" dirty="0"/>
           </a:p>
@@ -3601,10 +3601,10 @@
       </p:sp>
       <p:sp>
         <p:nvSpPr>
-          <p:cNvPr id="9" name="Rectangle 8">
-            <a:extLst>
-              <a:ext uri="{FF2B5EF4-FFF2-40B4-BE49-F238E27FC236}">
-                <a16:creationId xmlns:a16="http://schemas.microsoft.com/office/drawing/2014/main" id="{316BD13C-DC3F-278A-B097-5FB86E44F1F6}"/>
+          <p:cNvPr id="11" name="Rectangle 10">
+            <a:extLst>
+              <a:ext uri="{FF2B5EF4-FFF2-40B4-BE49-F238E27FC236}">
+                <a16:creationId xmlns:a16="http://schemas.microsoft.com/office/drawing/2014/main" id="{2F0A9767-7575-4EB1-5B54-04EFD1F12627}"/>
               </a:ext>
             </a:extLst>
           </p:cNvPr>
@@ -3613,7 +3613,7 @@
         </p:nvSpPr>
         <p:spPr>
           <a:xfrm>
-            <a:off x="7446739" y="2571750"/>
+            <a:off x="7443110" y="4316187"/>
             <a:ext cx="1885950" cy="628650"/>
           </a:xfrm>
           <a:prstGeom prst="rect">
@@ -3641,7 +3641,7 @@
             <a:pPr algn="ctr"/>
             <a:r>
               <a:rPr lang="en-US" dirty="0"/>
-              <a:t>Tissue</a:t>
+              <a:t>Liver</a:t>
             </a:r>
             <a:endParaRPr lang="nb-NO" dirty="0"/>
           </a:p>
@@ -3649,10 +3649,10 @@
       </p:sp>
       <p:sp>
         <p:nvSpPr>
-          <p:cNvPr id="10" name="Rectangle 9">
-            <a:extLst>
-              <a:ext uri="{FF2B5EF4-FFF2-40B4-BE49-F238E27FC236}">
-                <a16:creationId xmlns:a16="http://schemas.microsoft.com/office/drawing/2014/main" id="{3711075B-257E-F8AF-F9FB-445C59F33C5F}"/>
+          <p:cNvPr id="12" name="Rectangle 11">
+            <a:extLst>
+              <a:ext uri="{FF2B5EF4-FFF2-40B4-BE49-F238E27FC236}">
+                <a16:creationId xmlns:a16="http://schemas.microsoft.com/office/drawing/2014/main" id="{AE9EAC3E-0D44-8DBC-3868-2377038E387C}"/>
               </a:ext>
             </a:extLst>
           </p:cNvPr>
@@ -3661,8 +3661,8 @@
         </p:nvSpPr>
         <p:spPr>
           <a:xfrm>
-            <a:off x="7443110" y="3456214"/>
-            <a:ext cx="1885950" cy="628650"/>
+            <a:off x="9979478" y="1714500"/>
+            <a:ext cx="685800" cy="3143250"/>
           </a:xfrm>
           <a:prstGeom prst="rect">
             <a:avLst/>
@@ -3688,19 +3688,22 @@
           <a:p>
             <a:pPr algn="ctr"/>
             <a:r>
-              <a:rPr lang="en-US" dirty="0"/>
-              <a:t>Kidney</a:t>
-            </a:r>
-            <a:endParaRPr lang="nb-NO" dirty="0"/>
-          </a:p>
-        </p:txBody>
-      </p:sp>
-      <p:sp>
-        <p:nvSpPr>
-          <p:cNvPr id="11" name="Rectangle 10">
-            <a:extLst>
-              <a:ext uri="{FF2B5EF4-FFF2-40B4-BE49-F238E27FC236}">
-                <a16:creationId xmlns:a16="http://schemas.microsoft.com/office/drawing/2014/main" id="{2F0A9767-7575-4EB1-5B54-04EFD1F12627}"/>
+              <a:rPr lang="nb-NO" sz="1100" b="1" dirty="0" err="1"/>
+              <a:t>Venous</a:t>
+            </a:r>
+            <a:r>
+              <a:rPr lang="nb-NO" sz="1100" b="1" dirty="0"/>
+              <a:t> Blood</a:t>
+            </a:r>
+          </a:p>
+        </p:txBody>
+      </p:sp>
+      <p:sp>
+        <p:nvSpPr>
+          <p:cNvPr id="13" name="Rectangle 12">
+            <a:extLst>
+              <a:ext uri="{FF2B5EF4-FFF2-40B4-BE49-F238E27FC236}">
+                <a16:creationId xmlns:a16="http://schemas.microsoft.com/office/drawing/2014/main" id="{D7891158-801D-7FDD-3940-963CEDBEF721}"/>
               </a:ext>
             </a:extLst>
           </p:cNvPr>
@@ -3709,8 +3712,8 @@
         </p:nvSpPr>
         <p:spPr>
           <a:xfrm>
-            <a:off x="7443110" y="4316187"/>
-            <a:ext cx="1885950" cy="628650"/>
+            <a:off x="1078595" y="1714500"/>
+            <a:ext cx="685800" cy="3143250"/>
           </a:xfrm>
           <a:prstGeom prst="rect">
             <a:avLst/>
@@ -3736,19 +3739,19 @@
           <a:p>
             <a:pPr algn="ctr"/>
             <a:r>
-              <a:rPr lang="en-US" dirty="0"/>
-              <a:t>Liver</a:t>
-            </a:r>
-            <a:endParaRPr lang="nb-NO" dirty="0"/>
-          </a:p>
-        </p:txBody>
-      </p:sp>
-      <p:sp>
-        <p:nvSpPr>
-          <p:cNvPr id="12" name="Rectangle 11">
-            <a:extLst>
-              <a:ext uri="{FF2B5EF4-FFF2-40B4-BE49-F238E27FC236}">
-                <a16:creationId xmlns:a16="http://schemas.microsoft.com/office/drawing/2014/main" id="{AE9EAC3E-0D44-8DBC-3868-2377038E387C}"/>
+              <a:rPr lang="en-US" sz="1100" b="1" dirty="0"/>
+              <a:t>Arterial Blood</a:t>
+            </a:r>
+            <a:endParaRPr lang="nb-NO" sz="1100" b="1" dirty="0"/>
+          </a:p>
+        </p:txBody>
+      </p:sp>
+      <p:sp>
+        <p:nvSpPr>
+          <p:cNvPr id="14" name="Rectangle 13">
+            <a:extLst>
+              <a:ext uri="{FF2B5EF4-FFF2-40B4-BE49-F238E27FC236}">
+                <a16:creationId xmlns:a16="http://schemas.microsoft.com/office/drawing/2014/main" id="{6DEBEFF8-D76C-AA0A-AD24-C9D3B17542D8}"/>
               </a:ext>
             </a:extLst>
           </p:cNvPr>
@@ -3757,7 +3760,7 @@
         </p:nvSpPr>
         <p:spPr>
           <a:xfrm>
-            <a:off x="9979478" y="1714500"/>
+            <a:off x="4957535" y="1714500"/>
             <a:ext cx="685800" cy="3143250"/>
           </a:xfrm>
           <a:prstGeom prst="rect">
@@ -3784,22 +3787,19 @@
           <a:p>
             <a:pPr algn="ctr"/>
             <a:r>
-              <a:rPr lang="nb-NO" sz="1100" b="1" dirty="0" err="1"/>
-              <a:t>Venous</a:t>
-            </a:r>
-            <a:r>
-              <a:rPr lang="nb-NO" sz="1100" b="1" dirty="0"/>
-              <a:t> Blood</a:t>
-            </a:r>
-          </a:p>
-        </p:txBody>
-      </p:sp>
-      <p:sp>
-        <p:nvSpPr>
-          <p:cNvPr id="13" name="Rectangle 12">
-            <a:extLst>
-              <a:ext uri="{FF2B5EF4-FFF2-40B4-BE49-F238E27FC236}">
-                <a16:creationId xmlns:a16="http://schemas.microsoft.com/office/drawing/2014/main" id="{D7891158-801D-7FDD-3940-963CEDBEF721}"/>
+              <a:rPr lang="en-US" sz="1100" b="1" dirty="0"/>
+              <a:t>Venous Blood</a:t>
+            </a:r>
+            <a:endParaRPr lang="nb-NO" sz="1100" b="1" dirty="0"/>
+          </a:p>
+        </p:txBody>
+      </p:sp>
+      <p:sp>
+        <p:nvSpPr>
+          <p:cNvPr id="15" name="Rectangle 14">
+            <a:extLst>
+              <a:ext uri="{FF2B5EF4-FFF2-40B4-BE49-F238E27FC236}">
+                <a16:creationId xmlns:a16="http://schemas.microsoft.com/office/drawing/2014/main" id="{C043DD2C-3CCD-679D-0BDE-7554A6A61624}"/>
               </a:ext>
             </a:extLst>
           </p:cNvPr>
@@ -3808,7 +3808,7 @@
         </p:nvSpPr>
         <p:spPr>
           <a:xfrm>
-            <a:off x="1078595" y="1714500"/>
+            <a:off x="6096000" y="1714500"/>
             <a:ext cx="685800" cy="3143250"/>
           </a:xfrm>
           <a:prstGeom prst="rect">
@@ -3844,10 +3844,10 @@
       </p:sp>
       <p:sp>
         <p:nvSpPr>
-          <p:cNvPr id="14" name="Rectangle 13">
-            <a:extLst>
-              <a:ext uri="{FF2B5EF4-FFF2-40B4-BE49-F238E27FC236}">
-                <a16:creationId xmlns:a16="http://schemas.microsoft.com/office/drawing/2014/main" id="{6DEBEFF8-D76C-AA0A-AD24-C9D3B17542D8}"/>
+          <p:cNvPr id="16" name="Rectangle: Rounded Corners 15">
+            <a:extLst>
+              <a:ext uri="{FF2B5EF4-FFF2-40B4-BE49-F238E27FC236}">
+                <a16:creationId xmlns:a16="http://schemas.microsoft.com/office/drawing/2014/main" id="{FB714F9A-419A-6E50-F27A-C522DE2020B8}"/>
               </a:ext>
             </a:extLst>
           </p:cNvPr>
@@ -3856,10 +3856,10 @@
         </p:nvSpPr>
         <p:spPr>
           <a:xfrm>
-            <a:off x="4957535" y="1714500"/>
-            <a:ext cx="685800" cy="3143250"/>
-          </a:xfrm>
-          <a:prstGeom prst="rect">
+            <a:off x="1637620" y="5904777"/>
+            <a:ext cx="857250" cy="628650"/>
+          </a:xfrm>
+          <a:prstGeom prst="roundRect">
             <a:avLst/>
           </a:prstGeom>
         </p:spPr>
@@ -3883,102 +3883,6 @@
           <a:p>
             <a:pPr algn="ctr"/>
             <a:r>
-              <a:rPr lang="en-US" sz="1100" b="1" dirty="0"/>
-              <a:t>Venous Blood</a:t>
-            </a:r>
-            <a:endParaRPr lang="nb-NO" sz="1100" b="1" dirty="0"/>
-          </a:p>
-        </p:txBody>
-      </p:sp>
-      <p:sp>
-        <p:nvSpPr>
-          <p:cNvPr id="15" name="Rectangle 14">
-            <a:extLst>
-              <a:ext uri="{FF2B5EF4-FFF2-40B4-BE49-F238E27FC236}">
-                <a16:creationId xmlns:a16="http://schemas.microsoft.com/office/drawing/2014/main" id="{C043DD2C-3CCD-679D-0BDE-7554A6A61624}"/>
-              </a:ext>
-            </a:extLst>
-          </p:cNvPr>
-          <p:cNvSpPr/>
-          <p:nvPr/>
-        </p:nvSpPr>
-        <p:spPr>
-          <a:xfrm>
-            <a:off x="6096000" y="1714500"/>
-            <a:ext cx="685800" cy="3143250"/>
-          </a:xfrm>
-          <a:prstGeom prst="rect">
-            <a:avLst/>
-          </a:prstGeom>
-        </p:spPr>
-        <p:style>
-          <a:lnRef idx="2">
-            <a:schemeClr val="accent6"/>
-          </a:lnRef>
-          <a:fillRef idx="1">
-            <a:schemeClr val="lt1"/>
-          </a:fillRef>
-          <a:effectRef idx="0">
-            <a:schemeClr val="accent6"/>
-          </a:effectRef>
-          <a:fontRef idx="minor">
-            <a:schemeClr val="dk1"/>
-          </a:fontRef>
-        </p:style>
-        <p:txBody>
-          <a:bodyPr rtlCol="0" anchor="ctr"/>
-          <a:lstStyle/>
-          <a:p>
-            <a:pPr algn="ctr"/>
-            <a:r>
-              <a:rPr lang="en-US" sz="1100" b="1" dirty="0"/>
-              <a:t>Arterial Blood</a:t>
-            </a:r>
-            <a:endParaRPr lang="nb-NO" sz="1100" b="1" dirty="0"/>
-          </a:p>
-        </p:txBody>
-      </p:sp>
-      <p:sp>
-        <p:nvSpPr>
-          <p:cNvPr id="16" name="Rectangle: Rounded Corners 15">
-            <a:extLst>
-              <a:ext uri="{FF2B5EF4-FFF2-40B4-BE49-F238E27FC236}">
-                <a16:creationId xmlns:a16="http://schemas.microsoft.com/office/drawing/2014/main" id="{FB714F9A-419A-6E50-F27A-C522DE2020B8}"/>
-              </a:ext>
-            </a:extLst>
-          </p:cNvPr>
-          <p:cNvSpPr/>
-          <p:nvPr/>
-        </p:nvSpPr>
-        <p:spPr>
-          <a:xfrm>
-            <a:off x="1637620" y="5904777"/>
-            <a:ext cx="857250" cy="628650"/>
-          </a:xfrm>
-          <a:prstGeom prst="roundRect">
-            <a:avLst/>
-          </a:prstGeom>
-        </p:spPr>
-        <p:style>
-          <a:lnRef idx="2">
-            <a:schemeClr val="accent6"/>
-          </a:lnRef>
-          <a:fillRef idx="1">
-            <a:schemeClr val="lt1"/>
-          </a:fillRef>
-          <a:effectRef idx="0">
-            <a:schemeClr val="accent6"/>
-          </a:effectRef>
-          <a:fontRef idx="minor">
-            <a:schemeClr val="dk1"/>
-          </a:fontRef>
-        </p:style>
-        <p:txBody>
-          <a:bodyPr rtlCol="0" anchor="ctr"/>
-          <a:lstStyle/>
-          <a:p>
-            <a:pPr algn="ctr"/>
-            <a:r>
               <a:rPr lang="en-US" b="1" dirty="0"/>
               <a:t>dose</a:t>
             </a:r>
@@ -4062,22 +3966,20 @@
       </p:sp>
       <p:cxnSp>
         <p:nvCxnSpPr>
-          <p:cNvPr id="20" name="Straight Arrow Connector 19">
-            <a:extLst>
-              <a:ext uri="{FF2B5EF4-FFF2-40B4-BE49-F238E27FC236}">
-                <a16:creationId xmlns:a16="http://schemas.microsoft.com/office/drawing/2014/main" id="{3FD98D4C-3E6A-AA02-0201-5C954A32D3A4}"/>
-              </a:ext>
-            </a:extLst>
-          </p:cNvPr>
-          <p:cNvCxnSpPr>
-            <a:cxnSpLocks/>
-          </p:cNvCxnSpPr>
+          <p:cNvPr id="21" name="Straight Arrow Connector 20">
+            <a:extLst>
+              <a:ext uri="{FF2B5EF4-FFF2-40B4-BE49-F238E27FC236}">
+                <a16:creationId xmlns:a16="http://schemas.microsoft.com/office/drawing/2014/main" id="{680C612E-9B2A-4F9F-99A7-BF8A36DF2B1A}"/>
+              </a:ext>
+            </a:extLst>
+          </p:cNvPr>
+          <p:cNvCxnSpPr/>
           <p:nvPr/>
         </p:nvCxnSpPr>
         <p:spPr>
-          <a:xfrm flipH="1">
-            <a:off x="1812471" y="2015217"/>
-            <a:ext cx="589645" cy="0"/>
+          <a:xfrm>
+            <a:off x="1745345" y="2971800"/>
+            <a:ext cx="650421" cy="0"/>
           </a:xfrm>
           <a:prstGeom prst="straightConnector1">
             <a:avLst/>
@@ -4109,10 +4011,10 @@
       </p:cxnSp>
       <p:cxnSp>
         <p:nvCxnSpPr>
-          <p:cNvPr id="21" name="Straight Arrow Connector 20">
-            <a:extLst>
-              <a:ext uri="{FF2B5EF4-FFF2-40B4-BE49-F238E27FC236}">
-                <a16:creationId xmlns:a16="http://schemas.microsoft.com/office/drawing/2014/main" id="{680C612E-9B2A-4F9F-99A7-BF8A36DF2B1A}"/>
+          <p:cNvPr id="22" name="Straight Arrow Connector 21">
+            <a:extLst>
+              <a:ext uri="{FF2B5EF4-FFF2-40B4-BE49-F238E27FC236}">
+                <a16:creationId xmlns:a16="http://schemas.microsoft.com/office/drawing/2014/main" id="{04B63A9C-0121-BD4D-A8FB-652D2E304059}"/>
               </a:ext>
             </a:extLst>
           </p:cNvPr>
@@ -4121,7 +4023,7 @@
         </p:nvCxnSpPr>
         <p:spPr>
           <a:xfrm>
-            <a:off x="1745345" y="2971800"/>
+            <a:off x="1751695" y="3829050"/>
             <a:ext cx="650421" cy="0"/>
           </a:xfrm>
           <a:prstGeom prst="straightConnector1">
@@ -4154,10 +4056,10 @@
       </p:cxnSp>
       <p:cxnSp>
         <p:nvCxnSpPr>
-          <p:cNvPr id="22" name="Straight Arrow Connector 21">
-            <a:extLst>
-              <a:ext uri="{FF2B5EF4-FFF2-40B4-BE49-F238E27FC236}">
-                <a16:creationId xmlns:a16="http://schemas.microsoft.com/office/drawing/2014/main" id="{04B63A9C-0121-BD4D-A8FB-652D2E304059}"/>
+          <p:cNvPr id="23" name="Straight Arrow Connector 22">
+            <a:extLst>
+              <a:ext uri="{FF2B5EF4-FFF2-40B4-BE49-F238E27FC236}">
+                <a16:creationId xmlns:a16="http://schemas.microsoft.com/office/drawing/2014/main" id="{4C881CB3-77CB-6FDF-AA42-6148791500C8}"/>
               </a:ext>
             </a:extLst>
           </p:cNvPr>
@@ -4166,7 +4068,7 @@
         </p:nvCxnSpPr>
         <p:spPr>
           <a:xfrm>
-            <a:off x="1751695" y="3829050"/>
+            <a:off x="1745344" y="4669974"/>
             <a:ext cx="650421" cy="0"/>
           </a:xfrm>
           <a:prstGeom prst="straightConnector1">
@@ -4199,20 +4101,22 @@
       </p:cxnSp>
       <p:cxnSp>
         <p:nvCxnSpPr>
-          <p:cNvPr id="23" name="Straight Arrow Connector 22">
-            <a:extLst>
-              <a:ext uri="{FF2B5EF4-FFF2-40B4-BE49-F238E27FC236}">
-                <a16:creationId xmlns:a16="http://schemas.microsoft.com/office/drawing/2014/main" id="{4C881CB3-77CB-6FDF-AA42-6148791500C8}"/>
-              </a:ext>
-            </a:extLst>
-          </p:cNvPr>
-          <p:cNvCxnSpPr/>
+          <p:cNvPr id="24" name="Straight Arrow Connector 23">
+            <a:extLst>
+              <a:ext uri="{FF2B5EF4-FFF2-40B4-BE49-F238E27FC236}">
+                <a16:creationId xmlns:a16="http://schemas.microsoft.com/office/drawing/2014/main" id="{3EBDCDBC-7001-4C08-534D-7D04487665DA}"/>
+              </a:ext>
+            </a:extLst>
+          </p:cNvPr>
+          <p:cNvCxnSpPr>
+            <a:cxnSpLocks/>
+          </p:cNvCxnSpPr>
           <p:nvPr/>
         </p:nvCxnSpPr>
         <p:spPr>
-          <a:xfrm>
-            <a:off x="1745344" y="4669974"/>
-            <a:ext cx="650421" cy="0"/>
+          <a:xfrm flipH="1">
+            <a:off x="1745344" y="2022021"/>
+            <a:ext cx="3151415" cy="0"/>
           </a:xfrm>
           <a:prstGeom prst="straightConnector1">
             <a:avLst/>
@@ -4244,22 +4148,20 @@
       </p:cxnSp>
       <p:cxnSp>
         <p:nvCxnSpPr>
-          <p:cNvPr id="24" name="Straight Arrow Connector 23">
-            <a:extLst>
-              <a:ext uri="{FF2B5EF4-FFF2-40B4-BE49-F238E27FC236}">
-                <a16:creationId xmlns:a16="http://schemas.microsoft.com/office/drawing/2014/main" id="{3EBDCDBC-7001-4C08-534D-7D04487665DA}"/>
-              </a:ext>
-            </a:extLst>
-          </p:cNvPr>
-          <p:cNvCxnSpPr>
-            <a:cxnSpLocks/>
-          </p:cNvCxnSpPr>
+          <p:cNvPr id="25" name="Straight Arrow Connector 24">
+            <a:extLst>
+              <a:ext uri="{FF2B5EF4-FFF2-40B4-BE49-F238E27FC236}">
+                <a16:creationId xmlns:a16="http://schemas.microsoft.com/office/drawing/2014/main" id="{9A02A2BF-5201-E827-E2F6-BA031D66A6D1}"/>
+              </a:ext>
+            </a:extLst>
+          </p:cNvPr>
+          <p:cNvCxnSpPr/>
           <p:nvPr/>
         </p:nvCxnSpPr>
         <p:spPr>
-          <a:xfrm flipH="1" flipV="1">
-            <a:off x="4342493" y="2015217"/>
-            <a:ext cx="554266" cy="6804"/>
+          <a:xfrm>
+            <a:off x="4281716" y="2800350"/>
+            <a:ext cx="650421" cy="0"/>
           </a:xfrm>
           <a:prstGeom prst="straightConnector1">
             <a:avLst/>
@@ -4291,10 +4193,10 @@
       </p:cxnSp>
       <p:cxnSp>
         <p:nvCxnSpPr>
-          <p:cNvPr id="25" name="Straight Arrow Connector 24">
-            <a:extLst>
-              <a:ext uri="{FF2B5EF4-FFF2-40B4-BE49-F238E27FC236}">
-                <a16:creationId xmlns:a16="http://schemas.microsoft.com/office/drawing/2014/main" id="{9A02A2BF-5201-E827-E2F6-BA031D66A6D1}"/>
+          <p:cNvPr id="26" name="Straight Arrow Connector 25">
+            <a:extLst>
+              <a:ext uri="{FF2B5EF4-FFF2-40B4-BE49-F238E27FC236}">
+                <a16:creationId xmlns:a16="http://schemas.microsoft.com/office/drawing/2014/main" id="{0EF79ED4-A5FB-4FF1-49CA-6463D247446B}"/>
               </a:ext>
             </a:extLst>
           </p:cNvPr>
@@ -4303,7 +4205,7 @@
         </p:nvCxnSpPr>
         <p:spPr>
           <a:xfrm>
-            <a:off x="4281716" y="2800350"/>
+            <a:off x="4281715" y="3733800"/>
             <a:ext cx="650421" cy="0"/>
           </a:xfrm>
           <a:prstGeom prst="straightConnector1">
@@ -4336,10 +4238,10 @@
       </p:cxnSp>
       <p:cxnSp>
         <p:nvCxnSpPr>
-          <p:cNvPr id="26" name="Straight Arrow Connector 25">
-            <a:extLst>
-              <a:ext uri="{FF2B5EF4-FFF2-40B4-BE49-F238E27FC236}">
-                <a16:creationId xmlns:a16="http://schemas.microsoft.com/office/drawing/2014/main" id="{0EF79ED4-A5FB-4FF1-49CA-6463D247446B}"/>
+          <p:cNvPr id="27" name="Straight Arrow Connector 26">
+            <a:extLst>
+              <a:ext uri="{FF2B5EF4-FFF2-40B4-BE49-F238E27FC236}">
+                <a16:creationId xmlns:a16="http://schemas.microsoft.com/office/drawing/2014/main" id="{84B6E693-CF38-2954-B297-54C469896319}"/>
               </a:ext>
             </a:extLst>
           </p:cNvPr>
@@ -4348,7 +4250,7 @@
         </p:nvCxnSpPr>
         <p:spPr>
           <a:xfrm>
-            <a:off x="4281715" y="3733800"/>
+            <a:off x="4307115" y="4630512"/>
             <a:ext cx="650421" cy="0"/>
           </a:xfrm>
           <a:prstGeom prst="straightConnector1">
@@ -4381,10 +4283,10 @@
       </p:cxnSp>
       <p:cxnSp>
         <p:nvCxnSpPr>
-          <p:cNvPr id="27" name="Straight Arrow Connector 26">
-            <a:extLst>
-              <a:ext uri="{FF2B5EF4-FFF2-40B4-BE49-F238E27FC236}">
-                <a16:creationId xmlns:a16="http://schemas.microsoft.com/office/drawing/2014/main" id="{84B6E693-CF38-2954-B297-54C469896319}"/>
+          <p:cNvPr id="29" name="Straight Arrow Connector 28">
+            <a:extLst>
+              <a:ext uri="{FF2B5EF4-FFF2-40B4-BE49-F238E27FC236}">
+                <a16:creationId xmlns:a16="http://schemas.microsoft.com/office/drawing/2014/main" id="{A6EB15EF-3FE3-1975-FD37-45BF38AAF584}"/>
               </a:ext>
             </a:extLst>
           </p:cNvPr>
@@ -4393,7 +4295,7 @@
         </p:nvCxnSpPr>
         <p:spPr>
           <a:xfrm>
-            <a:off x="4307115" y="4630512"/>
+            <a:off x="6792688" y="2886075"/>
             <a:ext cx="650421" cy="0"/>
           </a:xfrm>
           <a:prstGeom prst="straightConnector1">
@@ -4426,22 +4328,20 @@
       </p:cxnSp>
       <p:cxnSp>
         <p:nvCxnSpPr>
-          <p:cNvPr id="28" name="Straight Arrow Connector 27">
-            <a:extLst>
-              <a:ext uri="{FF2B5EF4-FFF2-40B4-BE49-F238E27FC236}">
-                <a16:creationId xmlns:a16="http://schemas.microsoft.com/office/drawing/2014/main" id="{0879AF23-9D50-40CF-EBCB-01A4D7420AFA}"/>
-              </a:ext>
-            </a:extLst>
-          </p:cNvPr>
-          <p:cNvCxnSpPr>
-            <a:cxnSpLocks/>
-          </p:cNvCxnSpPr>
+          <p:cNvPr id="30" name="Straight Arrow Connector 29">
+            <a:extLst>
+              <a:ext uri="{FF2B5EF4-FFF2-40B4-BE49-F238E27FC236}">
+                <a16:creationId xmlns:a16="http://schemas.microsoft.com/office/drawing/2014/main" id="{C1CA1A7A-D459-C662-9A94-BC92AE3916D9}"/>
+              </a:ext>
+            </a:extLst>
+          </p:cNvPr>
+          <p:cNvCxnSpPr/>
           <p:nvPr/>
         </p:nvCxnSpPr>
         <p:spPr>
-          <a:xfrm flipH="1">
-            <a:off x="6792686" y="2015217"/>
-            <a:ext cx="637950" cy="0"/>
+          <a:xfrm>
+            <a:off x="6792687" y="3829504"/>
+            <a:ext cx="650421" cy="0"/>
           </a:xfrm>
           <a:prstGeom prst="straightConnector1">
             <a:avLst/>
@@ -4473,10 +4373,10 @@
       </p:cxnSp>
       <p:cxnSp>
         <p:nvCxnSpPr>
-          <p:cNvPr id="29" name="Straight Arrow Connector 28">
-            <a:extLst>
-              <a:ext uri="{FF2B5EF4-FFF2-40B4-BE49-F238E27FC236}">
-                <a16:creationId xmlns:a16="http://schemas.microsoft.com/office/drawing/2014/main" id="{A6EB15EF-3FE3-1975-FD37-45BF38AAF584}"/>
+          <p:cNvPr id="31" name="Straight Arrow Connector 30">
+            <a:extLst>
+              <a:ext uri="{FF2B5EF4-FFF2-40B4-BE49-F238E27FC236}">
+                <a16:creationId xmlns:a16="http://schemas.microsoft.com/office/drawing/2014/main" id="{764B4A86-74C2-9294-C517-73998B0651B6}"/>
               </a:ext>
             </a:extLst>
           </p:cNvPr>
@@ -4485,7 +4385,7 @@
         </p:nvCxnSpPr>
         <p:spPr>
           <a:xfrm>
-            <a:off x="6792688" y="2886075"/>
+            <a:off x="6792686" y="4669974"/>
             <a:ext cx="650421" cy="0"/>
           </a:xfrm>
           <a:prstGeom prst="straightConnector1">
@@ -4518,20 +4418,22 @@
       </p:cxnSp>
       <p:cxnSp>
         <p:nvCxnSpPr>
-          <p:cNvPr id="30" name="Straight Arrow Connector 29">
-            <a:extLst>
-              <a:ext uri="{FF2B5EF4-FFF2-40B4-BE49-F238E27FC236}">
-                <a16:creationId xmlns:a16="http://schemas.microsoft.com/office/drawing/2014/main" id="{C1CA1A7A-D459-C662-9A94-BC92AE3916D9}"/>
-              </a:ext>
-            </a:extLst>
-          </p:cNvPr>
-          <p:cNvCxnSpPr/>
+          <p:cNvPr id="32" name="Straight Arrow Connector 31">
+            <a:extLst>
+              <a:ext uri="{FF2B5EF4-FFF2-40B4-BE49-F238E27FC236}">
+                <a16:creationId xmlns:a16="http://schemas.microsoft.com/office/drawing/2014/main" id="{5725C2D2-63FF-678E-14B3-D05C67304E2D}"/>
+              </a:ext>
+            </a:extLst>
+          </p:cNvPr>
+          <p:cNvCxnSpPr>
+            <a:cxnSpLocks/>
+          </p:cNvCxnSpPr>
           <p:nvPr/>
         </p:nvCxnSpPr>
         <p:spPr>
-          <a:xfrm>
-            <a:off x="6792687" y="3829504"/>
-            <a:ext cx="650421" cy="0"/>
+          <a:xfrm flipH="1">
+            <a:off x="6781800" y="2015217"/>
+            <a:ext cx="3208567" cy="6804"/>
           </a:xfrm>
           <a:prstGeom prst="straightConnector1">
             <a:avLst/>
@@ -4563,10 +4465,10 @@
       </p:cxnSp>
       <p:cxnSp>
         <p:nvCxnSpPr>
-          <p:cNvPr id="31" name="Straight Arrow Connector 30">
-            <a:extLst>
-              <a:ext uri="{FF2B5EF4-FFF2-40B4-BE49-F238E27FC236}">
-                <a16:creationId xmlns:a16="http://schemas.microsoft.com/office/drawing/2014/main" id="{764B4A86-74C2-9294-C517-73998B0651B6}"/>
+          <p:cNvPr id="33" name="Straight Arrow Connector 32">
+            <a:extLst>
+              <a:ext uri="{FF2B5EF4-FFF2-40B4-BE49-F238E27FC236}">
+                <a16:creationId xmlns:a16="http://schemas.microsoft.com/office/drawing/2014/main" id="{4CFBFCC5-A173-1983-4A72-0F4817EC1E91}"/>
               </a:ext>
             </a:extLst>
           </p:cNvPr>
@@ -4575,7 +4477,7 @@
         </p:nvCxnSpPr>
         <p:spPr>
           <a:xfrm>
-            <a:off x="6792686" y="4669974"/>
+            <a:off x="9329059" y="2800350"/>
             <a:ext cx="650421" cy="0"/>
           </a:xfrm>
           <a:prstGeom prst="straightConnector1">
@@ -4608,22 +4510,20 @@
       </p:cxnSp>
       <p:cxnSp>
         <p:nvCxnSpPr>
-          <p:cNvPr id="32" name="Straight Arrow Connector 31">
-            <a:extLst>
-              <a:ext uri="{FF2B5EF4-FFF2-40B4-BE49-F238E27FC236}">
-                <a16:creationId xmlns:a16="http://schemas.microsoft.com/office/drawing/2014/main" id="{5725C2D2-63FF-678E-14B3-D05C67304E2D}"/>
-              </a:ext>
-            </a:extLst>
-          </p:cNvPr>
-          <p:cNvCxnSpPr>
-            <a:cxnSpLocks/>
-          </p:cNvCxnSpPr>
+          <p:cNvPr id="34" name="Straight Arrow Connector 33">
+            <a:extLst>
+              <a:ext uri="{FF2B5EF4-FFF2-40B4-BE49-F238E27FC236}">
+                <a16:creationId xmlns:a16="http://schemas.microsoft.com/office/drawing/2014/main" id="{84A452BB-A513-E260-3ED5-AA2179A0036C}"/>
+              </a:ext>
+            </a:extLst>
+          </p:cNvPr>
+          <p:cNvCxnSpPr/>
           <p:nvPr/>
         </p:nvCxnSpPr>
         <p:spPr>
-          <a:xfrm flipH="1">
-            <a:off x="9329057" y="2015217"/>
-            <a:ext cx="661310" cy="0"/>
+          <a:xfrm>
+            <a:off x="9329058" y="3733800"/>
+            <a:ext cx="650421" cy="0"/>
           </a:xfrm>
           <a:prstGeom prst="straightConnector1">
             <a:avLst/>
@@ -4655,10 +4555,10 @@
       </p:cxnSp>
       <p:cxnSp>
         <p:nvCxnSpPr>
-          <p:cNvPr id="33" name="Straight Arrow Connector 32">
-            <a:extLst>
-              <a:ext uri="{FF2B5EF4-FFF2-40B4-BE49-F238E27FC236}">
-                <a16:creationId xmlns:a16="http://schemas.microsoft.com/office/drawing/2014/main" id="{4CFBFCC5-A173-1983-4A72-0F4817EC1E91}"/>
+          <p:cNvPr id="35" name="Straight Arrow Connector 34">
+            <a:extLst>
+              <a:ext uri="{FF2B5EF4-FFF2-40B4-BE49-F238E27FC236}">
+                <a16:creationId xmlns:a16="http://schemas.microsoft.com/office/drawing/2014/main" id="{3162EB67-9500-1C54-F15F-5212369E2A80}"/>
               </a:ext>
             </a:extLst>
           </p:cNvPr>
@@ -4667,188 +4567,8 @@
         </p:nvCxnSpPr>
         <p:spPr>
           <a:xfrm>
-            <a:off x="9329059" y="2800350"/>
-            <a:ext cx="650421" cy="0"/>
-          </a:xfrm>
-          <a:prstGeom prst="straightConnector1">
-            <a:avLst/>
-          </a:prstGeom>
-          <a:ln w="19050" cap="flat" cmpd="sng" algn="ctr">
-            <a:solidFill>
-              <a:schemeClr val="accent1"/>
-            </a:solidFill>
-            <a:prstDash val="solid"/>
-            <a:round/>
-            <a:headEnd type="none" w="med" len="med"/>
-            <a:tailEnd type="arrow" w="med" len="med"/>
-          </a:ln>
-        </p:spPr>
-        <p:style>
-          <a:lnRef idx="0">
-            <a:scrgbClr r="0" g="0" b="0"/>
-          </a:lnRef>
-          <a:fillRef idx="0">
-            <a:scrgbClr r="0" g="0" b="0"/>
-          </a:fillRef>
-          <a:effectRef idx="0">
-            <a:scrgbClr r="0" g="0" b="0"/>
-          </a:effectRef>
-          <a:fontRef idx="minor">
-            <a:schemeClr val="tx1"/>
-          </a:fontRef>
-        </p:style>
-      </p:cxnSp>
-      <p:cxnSp>
-        <p:nvCxnSpPr>
-          <p:cNvPr id="34" name="Straight Arrow Connector 33">
-            <a:extLst>
-              <a:ext uri="{FF2B5EF4-FFF2-40B4-BE49-F238E27FC236}">
-                <a16:creationId xmlns:a16="http://schemas.microsoft.com/office/drawing/2014/main" id="{84A452BB-A513-E260-3ED5-AA2179A0036C}"/>
-              </a:ext>
-            </a:extLst>
-          </p:cNvPr>
-          <p:cNvCxnSpPr/>
-          <p:nvPr/>
-        </p:nvCxnSpPr>
-        <p:spPr>
-          <a:xfrm>
-            <a:off x="9329058" y="3733800"/>
-            <a:ext cx="650421" cy="0"/>
-          </a:xfrm>
-          <a:prstGeom prst="straightConnector1">
-            <a:avLst/>
-          </a:prstGeom>
-          <a:ln w="19050" cap="flat" cmpd="sng" algn="ctr">
-            <a:solidFill>
-              <a:schemeClr val="accent1"/>
-            </a:solidFill>
-            <a:prstDash val="solid"/>
-            <a:round/>
-            <a:headEnd type="none" w="med" len="med"/>
-            <a:tailEnd type="arrow" w="med" len="med"/>
-          </a:ln>
-        </p:spPr>
-        <p:style>
-          <a:lnRef idx="0">
-            <a:scrgbClr r="0" g="0" b="0"/>
-          </a:lnRef>
-          <a:fillRef idx="0">
-            <a:scrgbClr r="0" g="0" b="0"/>
-          </a:fillRef>
-          <a:effectRef idx="0">
-            <a:scrgbClr r="0" g="0" b="0"/>
-          </a:effectRef>
-          <a:fontRef idx="minor">
-            <a:schemeClr val="tx1"/>
-          </a:fontRef>
-        </p:style>
-      </p:cxnSp>
-      <p:cxnSp>
-        <p:nvCxnSpPr>
-          <p:cNvPr id="35" name="Straight Arrow Connector 34">
-            <a:extLst>
-              <a:ext uri="{FF2B5EF4-FFF2-40B4-BE49-F238E27FC236}">
-                <a16:creationId xmlns:a16="http://schemas.microsoft.com/office/drawing/2014/main" id="{3162EB67-9500-1C54-F15F-5212369E2A80}"/>
-              </a:ext>
-            </a:extLst>
-          </p:cNvPr>
-          <p:cNvCxnSpPr/>
-          <p:nvPr/>
-        </p:nvCxnSpPr>
-        <p:spPr>
-          <a:xfrm>
             <a:off x="9329057" y="4630512"/>
             <a:ext cx="650421" cy="0"/>
-          </a:xfrm>
-          <a:prstGeom prst="straightConnector1">
-            <a:avLst/>
-          </a:prstGeom>
-          <a:ln w="19050" cap="flat" cmpd="sng" algn="ctr">
-            <a:solidFill>
-              <a:schemeClr val="accent1"/>
-            </a:solidFill>
-            <a:prstDash val="solid"/>
-            <a:round/>
-            <a:headEnd type="none" w="med" len="med"/>
-            <a:tailEnd type="arrow" w="med" len="med"/>
-          </a:ln>
-        </p:spPr>
-        <p:style>
-          <a:lnRef idx="0">
-            <a:scrgbClr r="0" g="0" b="0"/>
-          </a:lnRef>
-          <a:fillRef idx="0">
-            <a:scrgbClr r="0" g="0" b="0"/>
-          </a:fillRef>
-          <a:effectRef idx="0">
-            <a:scrgbClr r="0" g="0" b="0"/>
-          </a:effectRef>
-          <a:fontRef idx="minor">
-            <a:schemeClr val="tx1"/>
-          </a:fontRef>
-        </p:style>
-      </p:cxnSp>
-      <p:cxnSp>
-        <p:nvCxnSpPr>
-          <p:cNvPr id="39" name="Straight Arrow Connector 38">
-            <a:extLst>
-              <a:ext uri="{FF2B5EF4-FFF2-40B4-BE49-F238E27FC236}">
-                <a16:creationId xmlns:a16="http://schemas.microsoft.com/office/drawing/2014/main" id="{BFAB19B6-2462-CFF9-0AF8-4E542C9FBE57}"/>
-              </a:ext>
-            </a:extLst>
-          </p:cNvPr>
-          <p:cNvCxnSpPr/>
-          <p:nvPr/>
-        </p:nvCxnSpPr>
-        <p:spPr>
-          <a:xfrm>
-            <a:off x="2728685" y="1085850"/>
-            <a:ext cx="0" cy="628650"/>
-          </a:xfrm>
-          <a:prstGeom prst="straightConnector1">
-            <a:avLst/>
-          </a:prstGeom>
-          <a:ln w="19050" cap="flat" cmpd="sng" algn="ctr">
-            <a:solidFill>
-              <a:schemeClr val="accent1"/>
-            </a:solidFill>
-            <a:prstDash val="solid"/>
-            <a:round/>
-            <a:headEnd type="none" w="med" len="med"/>
-            <a:tailEnd type="arrow" w="med" len="med"/>
-          </a:ln>
-        </p:spPr>
-        <p:style>
-          <a:lnRef idx="0">
-            <a:scrgbClr r="0" g="0" b="0"/>
-          </a:lnRef>
-          <a:fillRef idx="0">
-            <a:scrgbClr r="0" g="0" b="0"/>
-          </a:fillRef>
-          <a:effectRef idx="0">
-            <a:scrgbClr r="0" g="0" b="0"/>
-          </a:effectRef>
-          <a:fontRef idx="minor">
-            <a:schemeClr val="tx1"/>
-          </a:fontRef>
-        </p:style>
-      </p:cxnSp>
-      <p:cxnSp>
-        <p:nvCxnSpPr>
-          <p:cNvPr id="41" name="Straight Arrow Connector 40">
-            <a:extLst>
-              <a:ext uri="{FF2B5EF4-FFF2-40B4-BE49-F238E27FC236}">
-                <a16:creationId xmlns:a16="http://schemas.microsoft.com/office/drawing/2014/main" id="{60259044-E8F7-E66B-3518-4A79209D3347}"/>
-              </a:ext>
-            </a:extLst>
-          </p:cNvPr>
-          <p:cNvCxnSpPr/>
-          <p:nvPr/>
-        </p:nvCxnSpPr>
-        <p:spPr>
-          <a:xfrm flipV="1">
-            <a:off x="3814535" y="1028700"/>
-            <a:ext cx="0" cy="685800"/>
           </a:xfrm>
           <a:prstGeom prst="straightConnector1">
             <a:avLst/>
@@ -5191,7 +4911,7 @@
         </p:nvSpPr>
         <p:spPr>
           <a:xfrm>
-            <a:off x="4296271" y="4614545"/>
+            <a:off x="3597774" y="4416558"/>
             <a:ext cx="686663" cy="461665"/>
           </a:xfrm>
           <a:prstGeom prst="rect">

</xml_diff>